<commit_message>
added the uml to the presentation
</commit_message>
<xml_diff>
--- a/Presentation1.pptx
+++ b/Presentation1.pptx
@@ -108,6 +108,11 @@
       </a:defRPr>
     </a:lvl9pPr>
   </p:defaultTextStyle>
+  <p:extLst>
+    <p:ext uri="{EFAFB233-063F-42B5-8137-9DF3F51BA10A}">
+      <p15:sldGuideLst xmlns:p15="http://schemas.microsoft.com/office/powerpoint/2012/main"/>
+    </p:ext>
+  </p:extLst>
 </p:presentation>
 </file>
 
@@ -4807,31 +4812,41 @@
           </a:p>
         </p:txBody>
       </p:sp>
-      <p:sp>
-        <p:nvSpPr>
-          <p:cNvPr id="3" name="Content Placeholder 2">
-            <a:extLst>
-              <a:ext uri="{FF2B5EF4-FFF2-40B4-BE49-F238E27FC236}">
-                <a16:creationId xmlns:a16="http://schemas.microsoft.com/office/drawing/2014/main" id="{D2428C94-E3F1-14BC-49CD-C1950CAA7BB7}"/>
-              </a:ext>
-            </a:extLst>
-          </p:cNvPr>
-          <p:cNvSpPr>
-            <a:spLocks noGrp="1"/>
-          </p:cNvSpPr>
+      <p:pic>
+        <p:nvPicPr>
+          <p:cNvPr id="5" name="Content Placeholder 4" descr="Diagram&#10;&#10;Description automatically generated">
+            <a:extLst>
+              <a:ext uri="{FF2B5EF4-FFF2-40B4-BE49-F238E27FC236}">
+                <a16:creationId xmlns:a16="http://schemas.microsoft.com/office/drawing/2014/main" id="{47D69C6D-3975-035C-F637-F02F8CE8DE4E}"/>
+              </a:ext>
+            </a:extLst>
+          </p:cNvPr>
+          <p:cNvPicPr>
+            <a:picLocks noGrp="1" noChangeAspect="1"/>
+          </p:cNvPicPr>
           <p:nvPr>
             <p:ph idx="1"/>
           </p:nvPr>
-        </p:nvSpPr>
-        <p:spPr/>
-        <p:txBody>
-          <a:bodyPr/>
-          <a:lstStyle/>
-          <a:p>
-            <a:endParaRPr lang="en-AU"/>
-          </a:p>
-        </p:txBody>
-      </p:sp>
+        </p:nvPicPr>
+        <p:blipFill>
+          <a:blip r:embed="rId2">
+            <a:extLst>
+              <a:ext uri="{28A0092B-C50C-407E-A947-70E740481C1C}">
+                <a14:useLocalDpi xmlns:a14="http://schemas.microsoft.com/office/drawing/2010/main" val="0"/>
+              </a:ext>
+            </a:extLst>
+          </a:blip>
+          <a:stretch>
+            <a:fillRect/>
+          </a:stretch>
+        </p:blipFill>
+        <p:spPr>
+          <a:xfrm>
+            <a:off x="65314" y="25291"/>
+            <a:ext cx="12213771" cy="6832709"/>
+          </a:xfrm>
+        </p:spPr>
+      </p:pic>
     </p:spTree>
     <p:extLst>
       <p:ext uri="{BB962C8B-B14F-4D97-AF65-F5344CB8AC3E}">

</xml_diff>

<commit_message>
added title page and awesome pictures of elevators
</commit_message>
<xml_diff>
--- a/Presentation1.pptx
+++ b/Presentation1.pptx
@@ -4640,7 +4640,10 @@
           </a:bodyPr>
           <a:lstStyle/>
           <a:p>
-            <a:endParaRPr lang="en-AU"/>
+            <a:r>
+              <a:rPr lang="en-AU" dirty="0"/>
+              <a:t>Elevator UML</a:t>
+            </a:r>
           </a:p>
         </p:txBody>
       </p:sp>
@@ -4663,7 +4666,7 @@
         <p:spPr>
           <a:xfrm>
             <a:off x="8208006" y="4113213"/>
-            <a:ext cx="2988000" cy="1655762"/>
+            <a:ext cx="2988000" cy="1251889"/>
           </a:xfrm>
         </p:spPr>
         <p:txBody>
@@ -4672,7 +4675,10 @@
           </a:bodyPr>
           <a:lstStyle/>
           <a:p>
-            <a:endParaRPr lang="en-AU"/>
+            <a:r>
+              <a:rPr lang="en-AU" sz="1400" dirty="0"/>
+              <a:t>By the us</a:t>
+            </a:r>
           </a:p>
         </p:txBody>
       </p:sp>

</xml_diff>

<commit_message>
the awesome pictures didnt save
</commit_message>
<xml_diff>
--- a/Presentation1.pptx
+++ b/Presentation1.pptx
@@ -10,6 +10,8 @@
     <p:sldId id="258" r:id="rId4"/>
     <p:sldId id="259" r:id="rId5"/>
     <p:sldId id="260" r:id="rId6"/>
+    <p:sldId id="261" r:id="rId7"/>
+    <p:sldId id="262" r:id="rId8"/>
   </p:sldIdLst>
   <p:sldSz cx="12192000" cy="6858000"/>
   <p:notesSz cx="6858000" cy="9144000"/>
@@ -4904,35 +4906,62 @@
           <a:bodyPr/>
           <a:lstStyle/>
           <a:p>
-            <a:endParaRPr lang="en-AU"/>
-          </a:p>
-        </p:txBody>
-      </p:sp>
-      <p:sp>
-        <p:nvSpPr>
-          <p:cNvPr id="3" name="Content Placeholder 2">
-            <a:extLst>
-              <a:ext uri="{FF2B5EF4-FFF2-40B4-BE49-F238E27FC236}">
-                <a16:creationId xmlns:a16="http://schemas.microsoft.com/office/drawing/2014/main" id="{81771CA8-64E5-62D4-5380-A01D8090ED34}"/>
-              </a:ext>
-            </a:extLst>
-          </p:cNvPr>
-          <p:cNvSpPr>
-            <a:spLocks noGrp="1"/>
-          </p:cNvSpPr>
+            <a:r>
+              <a:rPr lang="en-AU" dirty="0"/>
+              <a:t>The Lift Class </a:t>
+            </a:r>
+          </a:p>
+        </p:txBody>
+      </p:sp>
+      <p:pic>
+        <p:nvPicPr>
+          <p:cNvPr id="1026" name="Picture 2" descr="The New York high life has given me a new fear – of elevators | Emma  Brockes | The Guardian">
+            <a:extLst>
+              <a:ext uri="{FF2B5EF4-FFF2-40B4-BE49-F238E27FC236}">
+                <a16:creationId xmlns:a16="http://schemas.microsoft.com/office/drawing/2014/main" id="{3578B7BC-A2CB-D274-BB27-223CC5B1FA55}"/>
+              </a:ext>
+            </a:extLst>
+          </p:cNvPr>
+          <p:cNvPicPr>
+            <a:picLocks noGrp="1" noChangeAspect="1" noChangeArrowheads="1"/>
+          </p:cNvPicPr>
           <p:nvPr>
             <p:ph idx="1"/>
           </p:nvPr>
-        </p:nvSpPr>
-        <p:spPr/>
-        <p:txBody>
-          <a:bodyPr/>
-          <a:lstStyle/>
-          <a:p>
-            <a:endParaRPr lang="en-AU"/>
-          </a:p>
-        </p:txBody>
-      </p:sp>
+        </p:nvPicPr>
+        <p:blipFill>
+          <a:blip r:embed="rId2">
+            <a:extLst>
+              <a:ext uri="{28A0092B-C50C-407E-A947-70E740481C1C}">
+                <a14:useLocalDpi xmlns:a14="http://schemas.microsoft.com/office/drawing/2010/main" val="0"/>
+              </a:ext>
+            </a:extLst>
+          </a:blip>
+          <a:srcRect/>
+          <a:stretch>
+            <a:fillRect/>
+          </a:stretch>
+        </p:blipFill>
+        <p:spPr bwMode="auto">
+          <a:xfrm>
+            <a:off x="6005805" y="0"/>
+            <a:ext cx="6186196" cy="6858000"/>
+          </a:xfrm>
+          <a:prstGeom prst="rect">
+            <a:avLst/>
+          </a:prstGeom>
+          <a:noFill/>
+          <a:extLst>
+            <a:ext uri="{909E8E84-426E-40DD-AFC4-6F175D3DCCD1}">
+              <a14:hiddenFill xmlns:a14="http://schemas.microsoft.com/office/drawing/2010/main">
+                <a:solidFill>
+                  <a:srgbClr val="FFFFFF"/>
+                </a:solidFill>
+              </a14:hiddenFill>
+            </a:ext>
+          </a:extLst>
+        </p:spPr>
+      </p:pic>
     </p:spTree>
     <p:extLst>
       <p:ext uri="{BB962C8B-B14F-4D97-AF65-F5344CB8AC3E}">
@@ -4984,35 +5013,62 @@
           <a:bodyPr/>
           <a:lstStyle/>
           <a:p>
-            <a:endParaRPr lang="en-AU"/>
-          </a:p>
-        </p:txBody>
-      </p:sp>
-      <p:sp>
-        <p:nvSpPr>
-          <p:cNvPr id="3" name="Content Placeholder 2">
-            <a:extLst>
-              <a:ext uri="{FF2B5EF4-FFF2-40B4-BE49-F238E27FC236}">
-                <a16:creationId xmlns:a16="http://schemas.microsoft.com/office/drawing/2014/main" id="{BC3C3FB3-EA61-C188-CB68-26A5DEA338BB}"/>
-              </a:ext>
-            </a:extLst>
-          </p:cNvPr>
-          <p:cNvSpPr>
-            <a:spLocks noGrp="1"/>
-          </p:cNvSpPr>
+            <a:r>
+              <a:rPr lang="en-AU" dirty="0"/>
+              <a:t>The Safety Features Class</a:t>
+            </a:r>
+          </a:p>
+        </p:txBody>
+      </p:sp>
+      <p:pic>
+        <p:nvPicPr>
+          <p:cNvPr id="2050" name="Picture 2" descr="How Many Post-Pandemic Office Workers Can Fit in One Elevator? - Propmodo">
+            <a:extLst>
+              <a:ext uri="{FF2B5EF4-FFF2-40B4-BE49-F238E27FC236}">
+                <a16:creationId xmlns:a16="http://schemas.microsoft.com/office/drawing/2014/main" id="{38600C59-01B9-AA06-DA15-EA581F297F71}"/>
+              </a:ext>
+            </a:extLst>
+          </p:cNvPr>
+          <p:cNvPicPr>
+            <a:picLocks noGrp="1" noChangeAspect="1" noChangeArrowheads="1"/>
+          </p:cNvPicPr>
           <p:nvPr>
             <p:ph idx="1"/>
           </p:nvPr>
-        </p:nvSpPr>
-        <p:spPr/>
-        <p:txBody>
-          <a:bodyPr/>
-          <a:lstStyle/>
-          <a:p>
-            <a:endParaRPr lang="en-AU"/>
-          </a:p>
-        </p:txBody>
-      </p:sp>
+        </p:nvPicPr>
+        <p:blipFill>
+          <a:blip r:embed="rId2">
+            <a:extLst>
+              <a:ext uri="{28A0092B-C50C-407E-A947-70E740481C1C}">
+                <a14:useLocalDpi xmlns:a14="http://schemas.microsoft.com/office/drawing/2010/main" val="0"/>
+              </a:ext>
+            </a:extLst>
+          </a:blip>
+          <a:srcRect/>
+          <a:stretch>
+            <a:fillRect/>
+          </a:stretch>
+        </p:blipFill>
+        <p:spPr bwMode="auto">
+          <a:xfrm>
+            <a:off x="6096001" y="0"/>
+            <a:ext cx="6096000" cy="6858000"/>
+          </a:xfrm>
+          <a:prstGeom prst="rect">
+            <a:avLst/>
+          </a:prstGeom>
+          <a:noFill/>
+          <a:extLst>
+            <a:ext uri="{909E8E84-426E-40DD-AFC4-6F175D3DCCD1}">
+              <a14:hiddenFill xmlns:a14="http://schemas.microsoft.com/office/drawing/2010/main">
+                <a:solidFill>
+                  <a:srgbClr val="FFFFFF"/>
+                </a:solidFill>
+              </a14:hiddenFill>
+            </a:ext>
+          </a:extLst>
+        </p:spPr>
+      </p:pic>
     </p:spTree>
     <p:extLst>
       <p:ext uri="{BB962C8B-B14F-4D97-AF65-F5344CB8AC3E}">
@@ -5064,39 +5120,326 @@
           <a:bodyPr/>
           <a:lstStyle/>
           <a:p>
+            <a:r>
+              <a:rPr lang="en-AU" dirty="0"/>
+              <a:t>The Extra Features Class</a:t>
+            </a:r>
+          </a:p>
+        </p:txBody>
+      </p:sp>
+      <p:sp>
+        <p:nvSpPr>
+          <p:cNvPr id="3" name="Content Placeholder 2">
+            <a:extLst>
+              <a:ext uri="{FF2B5EF4-FFF2-40B4-BE49-F238E27FC236}">
+                <a16:creationId xmlns:a16="http://schemas.microsoft.com/office/drawing/2014/main" id="{9537B092-3D1A-B029-089C-BBCE4171FD60}"/>
+              </a:ext>
+            </a:extLst>
+          </p:cNvPr>
+          <p:cNvSpPr>
+            <a:spLocks noGrp="1"/>
+          </p:cNvSpPr>
+          <p:nvPr>
+            <p:ph idx="1"/>
+          </p:nvPr>
+        </p:nvSpPr>
+        <p:spPr/>
+        <p:txBody>
+          <a:bodyPr/>
+          <a:lstStyle/>
+          <a:p>
             <a:endParaRPr lang="en-AU"/>
           </a:p>
         </p:txBody>
       </p:sp>
-      <p:sp>
-        <p:nvSpPr>
-          <p:cNvPr id="3" name="Content Placeholder 2">
-            <a:extLst>
-              <a:ext uri="{FF2B5EF4-FFF2-40B4-BE49-F238E27FC236}">
-                <a16:creationId xmlns:a16="http://schemas.microsoft.com/office/drawing/2014/main" id="{9537B092-3D1A-B029-089C-BBCE4171FD60}"/>
-              </a:ext>
-            </a:extLst>
-          </p:cNvPr>
-          <p:cNvSpPr>
-            <a:spLocks noGrp="1"/>
-          </p:cNvSpPr>
-          <p:nvPr>
-            <p:ph idx="1"/>
-          </p:nvPr>
-        </p:nvSpPr>
-        <p:spPr/>
-        <p:txBody>
-          <a:bodyPr/>
-          <a:lstStyle/>
-          <a:p>
-            <a:endParaRPr lang="en-AU"/>
-          </a:p>
-        </p:txBody>
-      </p:sp>
+      <p:pic>
+        <p:nvPicPr>
+          <p:cNvPr id="3074" name="Picture 2" descr="Realistic Elevator Cabin With Closed Doors Inside Stock Illustration -  Download Image Now - Elevator, Indoors, Inside Of - iStock">
+            <a:extLst>
+              <a:ext uri="{FF2B5EF4-FFF2-40B4-BE49-F238E27FC236}">
+                <a16:creationId xmlns:a16="http://schemas.microsoft.com/office/drawing/2014/main" id="{FD7C35FF-3CC5-35A0-93E7-FAECBD6A1DDA}"/>
+              </a:ext>
+            </a:extLst>
+          </p:cNvPr>
+          <p:cNvPicPr>
+            <a:picLocks noChangeAspect="1" noChangeArrowheads="1"/>
+          </p:cNvPicPr>
+          <p:nvPr/>
+        </p:nvPicPr>
+        <p:blipFill>
+          <a:blip r:embed="rId2">
+            <a:extLst>
+              <a:ext uri="{28A0092B-C50C-407E-A947-70E740481C1C}">
+                <a14:useLocalDpi xmlns:a14="http://schemas.microsoft.com/office/drawing/2010/main" val="0"/>
+              </a:ext>
+            </a:extLst>
+          </a:blip>
+          <a:srcRect/>
+          <a:stretch>
+            <a:fillRect/>
+          </a:stretch>
+        </p:blipFill>
+        <p:spPr bwMode="auto">
+          <a:xfrm>
+            <a:off x="6522099" y="0"/>
+            <a:ext cx="5669902" cy="6858000"/>
+          </a:xfrm>
+          <a:prstGeom prst="rect">
+            <a:avLst/>
+          </a:prstGeom>
+          <a:noFill/>
+          <a:extLst>
+            <a:ext uri="{909E8E84-426E-40DD-AFC4-6F175D3DCCD1}">
+              <a14:hiddenFill xmlns:a14="http://schemas.microsoft.com/office/drawing/2010/main">
+                <a:solidFill>
+                  <a:srgbClr val="FFFFFF"/>
+                </a:solidFill>
+              </a14:hiddenFill>
+            </a:ext>
+          </a:extLst>
+        </p:spPr>
+      </p:pic>
     </p:spTree>
     <p:extLst>
       <p:ext uri="{BB962C8B-B14F-4D97-AF65-F5344CB8AC3E}">
         <p14:creationId xmlns:p14="http://schemas.microsoft.com/office/powerpoint/2010/main" val="4228371866"/>
+      </p:ext>
+    </p:extLst>
+  </p:cSld>
+  <p:clrMapOvr>
+    <a:masterClrMapping/>
+  </p:clrMapOvr>
+</p:sld>
+</file>
+
+<file path=ppt/slides/slide6.xml><?xml version="1.0" encoding="utf-8"?>
+<p:sld xmlns:a="http://schemas.openxmlformats.org/drawingml/2006/main" xmlns:r="http://schemas.openxmlformats.org/officeDocument/2006/relationships" xmlns:p="http://schemas.openxmlformats.org/presentationml/2006/main">
+  <p:cSld>
+    <p:spTree>
+      <p:nvGrpSpPr>
+        <p:cNvPr id="1" name=""/>
+        <p:cNvGrpSpPr/>
+        <p:nvPr/>
+      </p:nvGrpSpPr>
+      <p:grpSpPr>
+        <a:xfrm>
+          <a:off x="0" y="0"/>
+          <a:ext cx="0" cy="0"/>
+          <a:chOff x="0" y="0"/>
+          <a:chExt cx="0" cy="0"/>
+        </a:xfrm>
+      </p:grpSpPr>
+      <p:sp>
+        <p:nvSpPr>
+          <p:cNvPr id="2" name="Title 1">
+            <a:extLst>
+              <a:ext uri="{FF2B5EF4-FFF2-40B4-BE49-F238E27FC236}">
+                <a16:creationId xmlns:a16="http://schemas.microsoft.com/office/drawing/2014/main" id="{14857E72-9790-F652-C42F-41A4D294A709}"/>
+              </a:ext>
+            </a:extLst>
+          </p:cNvPr>
+          <p:cNvSpPr>
+            <a:spLocks noGrp="1"/>
+          </p:cNvSpPr>
+          <p:nvPr>
+            <p:ph type="title"/>
+          </p:nvPr>
+        </p:nvSpPr>
+        <p:spPr/>
+        <p:txBody>
+          <a:bodyPr/>
+          <a:lstStyle/>
+          <a:p>
+            <a:r>
+              <a:rPr lang="en-AU" dirty="0"/>
+              <a:t>The Control Panel Class</a:t>
+            </a:r>
+          </a:p>
+        </p:txBody>
+      </p:sp>
+      <p:sp>
+        <p:nvSpPr>
+          <p:cNvPr id="3" name="Content Placeholder 2">
+            <a:extLst>
+              <a:ext uri="{FF2B5EF4-FFF2-40B4-BE49-F238E27FC236}">
+                <a16:creationId xmlns:a16="http://schemas.microsoft.com/office/drawing/2014/main" id="{E65D6727-B2AC-C93B-8E1C-FFDAF36DB196}"/>
+              </a:ext>
+            </a:extLst>
+          </p:cNvPr>
+          <p:cNvSpPr>
+            <a:spLocks noGrp="1"/>
+          </p:cNvSpPr>
+          <p:nvPr>
+            <p:ph idx="1"/>
+          </p:nvPr>
+        </p:nvSpPr>
+        <p:spPr/>
+        <p:txBody>
+          <a:bodyPr/>
+          <a:lstStyle/>
+          <a:p>
+            <a:endParaRPr lang="en-AU" dirty="0"/>
+          </a:p>
+        </p:txBody>
+      </p:sp>
+      <p:pic>
+        <p:nvPicPr>
+          <p:cNvPr id="4098" name="Picture 2" descr="Elevator screens - XPO Screens">
+            <a:extLst>
+              <a:ext uri="{FF2B5EF4-FFF2-40B4-BE49-F238E27FC236}">
+                <a16:creationId xmlns:a16="http://schemas.microsoft.com/office/drawing/2014/main" id="{73226A17-BFC3-452A-4F80-0A8A575F99CE}"/>
+              </a:ext>
+            </a:extLst>
+          </p:cNvPr>
+          <p:cNvPicPr>
+            <a:picLocks noChangeAspect="1" noChangeArrowheads="1"/>
+          </p:cNvPicPr>
+          <p:nvPr/>
+        </p:nvPicPr>
+        <p:blipFill>
+          <a:blip r:embed="rId2">
+            <a:extLst>
+              <a:ext uri="{28A0092B-C50C-407E-A947-70E740481C1C}">
+                <a14:useLocalDpi xmlns:a14="http://schemas.microsoft.com/office/drawing/2010/main" val="0"/>
+              </a:ext>
+            </a:extLst>
+          </a:blip>
+          <a:srcRect/>
+          <a:stretch>
+            <a:fillRect/>
+          </a:stretch>
+        </p:blipFill>
+        <p:spPr bwMode="auto">
+          <a:xfrm>
+            <a:off x="6438122" y="-92076"/>
+            <a:ext cx="5753878" cy="6950075"/>
+          </a:xfrm>
+          <a:prstGeom prst="rect">
+            <a:avLst/>
+          </a:prstGeom>
+          <a:noFill/>
+          <a:extLst>
+            <a:ext uri="{909E8E84-426E-40DD-AFC4-6F175D3DCCD1}">
+              <a14:hiddenFill xmlns:a14="http://schemas.microsoft.com/office/drawing/2010/main">
+                <a:solidFill>
+                  <a:srgbClr val="FFFFFF"/>
+                </a:solidFill>
+              </a14:hiddenFill>
+            </a:ext>
+          </a:extLst>
+        </p:spPr>
+      </p:pic>
+    </p:spTree>
+    <p:extLst>
+      <p:ext uri="{BB962C8B-B14F-4D97-AF65-F5344CB8AC3E}">
+        <p14:creationId xmlns:p14="http://schemas.microsoft.com/office/powerpoint/2010/main" val="2762861973"/>
+      </p:ext>
+    </p:extLst>
+  </p:cSld>
+  <p:clrMapOvr>
+    <a:masterClrMapping/>
+  </p:clrMapOvr>
+</p:sld>
+</file>
+
+<file path=ppt/slides/slide7.xml><?xml version="1.0" encoding="utf-8"?>
+<p:sld xmlns:a="http://schemas.openxmlformats.org/drawingml/2006/main" xmlns:r="http://schemas.openxmlformats.org/officeDocument/2006/relationships" xmlns:p="http://schemas.openxmlformats.org/presentationml/2006/main">
+  <p:cSld>
+    <p:spTree>
+      <p:nvGrpSpPr>
+        <p:cNvPr id="1" name=""/>
+        <p:cNvGrpSpPr/>
+        <p:nvPr/>
+      </p:nvGrpSpPr>
+      <p:grpSpPr>
+        <a:xfrm>
+          <a:off x="0" y="0"/>
+          <a:ext cx="0" cy="0"/>
+          <a:chOff x="0" y="0"/>
+          <a:chExt cx="0" cy="0"/>
+        </a:xfrm>
+      </p:grpSpPr>
+      <p:sp>
+        <p:nvSpPr>
+          <p:cNvPr id="2" name="Title 1">
+            <a:extLst>
+              <a:ext uri="{FF2B5EF4-FFF2-40B4-BE49-F238E27FC236}">
+                <a16:creationId xmlns:a16="http://schemas.microsoft.com/office/drawing/2014/main" id="{028109AD-546B-9733-4A93-B73493ECAA06}"/>
+              </a:ext>
+            </a:extLst>
+          </p:cNvPr>
+          <p:cNvSpPr>
+            <a:spLocks noGrp="1"/>
+          </p:cNvSpPr>
+          <p:nvPr>
+            <p:ph type="title"/>
+          </p:nvPr>
+        </p:nvSpPr>
+        <p:spPr/>
+        <p:txBody>
+          <a:bodyPr/>
+          <a:lstStyle/>
+          <a:p>
+            <a:r>
+              <a:rPr lang="en-AU" dirty="0"/>
+              <a:t>The Control Class</a:t>
+            </a:r>
+          </a:p>
+        </p:txBody>
+      </p:sp>
+      <p:pic>
+        <p:nvPicPr>
+          <p:cNvPr id="5122" name="Picture 2" descr="23,984 Inside Elevator Stock Photos, Pictures &amp; Royalty-Free Images - iStock">
+            <a:extLst>
+              <a:ext uri="{FF2B5EF4-FFF2-40B4-BE49-F238E27FC236}">
+                <a16:creationId xmlns:a16="http://schemas.microsoft.com/office/drawing/2014/main" id="{EFA45AFA-DC47-E7AE-AB11-067B4F07E301}"/>
+              </a:ext>
+            </a:extLst>
+          </p:cNvPr>
+          <p:cNvPicPr>
+            <a:picLocks noGrp="1" noChangeAspect="1" noChangeArrowheads="1"/>
+          </p:cNvPicPr>
+          <p:nvPr>
+            <p:ph idx="1"/>
+          </p:nvPr>
+        </p:nvPicPr>
+        <p:blipFill>
+          <a:blip r:embed="rId2">
+            <a:extLst>
+              <a:ext uri="{28A0092B-C50C-407E-A947-70E740481C1C}">
+                <a14:useLocalDpi xmlns:a14="http://schemas.microsoft.com/office/drawing/2010/main" val="0"/>
+              </a:ext>
+            </a:extLst>
+          </a:blip>
+          <a:srcRect/>
+          <a:stretch>
+            <a:fillRect/>
+          </a:stretch>
+        </p:blipFill>
+        <p:spPr bwMode="auto">
+          <a:xfrm>
+            <a:off x="6503437" y="0"/>
+            <a:ext cx="5688563" cy="6858000"/>
+          </a:xfrm>
+          <a:prstGeom prst="rect">
+            <a:avLst/>
+          </a:prstGeom>
+          <a:noFill/>
+          <a:extLst>
+            <a:ext uri="{909E8E84-426E-40DD-AFC4-6F175D3DCCD1}">
+              <a14:hiddenFill xmlns:a14="http://schemas.microsoft.com/office/drawing/2010/main">
+                <a:solidFill>
+                  <a:srgbClr val="FFFFFF"/>
+                </a:solidFill>
+              </a14:hiddenFill>
+            </a:ext>
+          </a:extLst>
+        </p:spPr>
+      </p:pic>
+    </p:spTree>
+    <p:extLst>
+      <p:ext uri="{BB962C8B-B14F-4D97-AF65-F5344CB8AC3E}">
+        <p14:creationId xmlns:p14="http://schemas.microsoft.com/office/powerpoint/2010/main" val="749992658"/>
       </p:ext>
     </p:extLst>
   </p:cSld>

</xml_diff>

<commit_message>
Added a second slide and img
</commit_message>
<xml_diff>
--- a/Presentation1.pptx
+++ b/Presentation1.pptx
@@ -4904,7 +4904,10 @@
           <a:bodyPr/>
           <a:lstStyle/>
           <a:p>
-            <a:endParaRPr lang="en-AU"/>
+            <a:r>
+              <a:rPr lang="en-AU" dirty="0"/>
+              <a:t>Lift </a:t>
+            </a:r>
           </a:p>
         </p:txBody>
       </p:sp>
@@ -4929,10 +4932,60 @@
           <a:bodyPr/>
           <a:lstStyle/>
           <a:p>
-            <a:endParaRPr lang="en-AU"/>
-          </a:p>
-        </p:txBody>
-      </p:sp>
+            <a:r>
+              <a:rPr lang="en-AU" dirty="0"/>
+              <a:t>The idea behind the lift section in the diagram was to control the movement of the lift to accurately move between floors and to keep track of where it currently is so it will know how much it needs to move by to get to the next floor </a:t>
+            </a:r>
+          </a:p>
+        </p:txBody>
+      </p:sp>
+      <p:pic>
+        <p:nvPicPr>
+          <p:cNvPr id="1026" name="Picture 2" descr="Robot chicken Emperor Palpatine on the escalator - YouTube">
+            <a:extLst>
+              <a:ext uri="{FF2B5EF4-FFF2-40B4-BE49-F238E27FC236}">
+                <a16:creationId xmlns:a16="http://schemas.microsoft.com/office/drawing/2014/main" id="{07146891-BDDB-370F-F77A-A681C26B94ED}"/>
+              </a:ext>
+            </a:extLst>
+          </p:cNvPr>
+          <p:cNvPicPr>
+            <a:picLocks noChangeAspect="1" noChangeArrowheads="1"/>
+          </p:cNvPicPr>
+          <p:nvPr/>
+        </p:nvPicPr>
+        <p:blipFill>
+          <a:blip r:embed="rId2">
+            <a:extLst>
+              <a:ext uri="{28A0092B-C50C-407E-A947-70E740481C1C}">
+                <a14:useLocalDpi xmlns:a14="http://schemas.microsoft.com/office/drawing/2010/main" val="0"/>
+              </a:ext>
+            </a:extLst>
+          </a:blip>
+          <a:srcRect/>
+          <a:stretch>
+            <a:fillRect/>
+          </a:stretch>
+        </p:blipFill>
+        <p:spPr bwMode="auto">
+          <a:xfrm>
+            <a:off x="6386945" y="3202478"/>
+            <a:ext cx="4572000" cy="3429000"/>
+          </a:xfrm>
+          <a:prstGeom prst="rect">
+            <a:avLst/>
+          </a:prstGeom>
+          <a:noFill/>
+          <a:extLst>
+            <a:ext uri="{909E8E84-426E-40DD-AFC4-6F175D3DCCD1}">
+              <a14:hiddenFill xmlns:a14="http://schemas.microsoft.com/office/drawing/2010/main">
+                <a:solidFill>
+                  <a:srgbClr val="FFFFFF"/>
+                </a:solidFill>
+              </a14:hiddenFill>
+            </a:ext>
+          </a:extLst>
+        </p:spPr>
+      </p:pic>
     </p:spTree>
     <p:extLst>
       <p:ext uri="{BB962C8B-B14F-4D97-AF65-F5344CB8AC3E}">
@@ -4986,13 +5039,8 @@
           <a:p>
             <a:r>
               <a:rPr lang="en-AU" dirty="0"/>
-              <a:t>The </a:t>
-            </a:r>
-            <a:r>
-              <a:rPr lang="en-AU"/>
-              <a:t>safety features</a:t>
-            </a:r>
-            <a:endParaRPr lang="en-AU" dirty="0"/>
+              <a:t>The safety features</a:t>
+            </a:r>
           </a:p>
         </p:txBody>
       </p:sp>

</xml_diff>

<commit_message>
added the lift slide
</commit_message>
<xml_diff>
--- a/Presentation1.pptx
+++ b/Presentation1.pptx
@@ -4962,6 +4962,90 @@
           </a:extLst>
         </p:spPr>
       </p:pic>
+      <p:sp>
+        <p:nvSpPr>
+          <p:cNvPr id="4" name="TextBox 3">
+            <a:extLst>
+              <a:ext uri="{FF2B5EF4-FFF2-40B4-BE49-F238E27FC236}">
+                <a16:creationId xmlns:a16="http://schemas.microsoft.com/office/drawing/2014/main" id="{B9298E39-8CEE-E552-4D0C-975CF52FB36F}"/>
+              </a:ext>
+            </a:extLst>
+          </p:cNvPr>
+          <p:cNvSpPr txBox="1"/>
+          <p:nvPr/>
+        </p:nvSpPr>
+        <p:spPr>
+          <a:xfrm>
+            <a:off x="332509" y="2219498"/>
+            <a:ext cx="4422371" cy="4801314"/>
+          </a:xfrm>
+          <a:prstGeom prst="rect">
+            <a:avLst/>
+          </a:prstGeom>
+          <a:noFill/>
+        </p:spPr>
+        <p:txBody>
+          <a:bodyPr wrap="square" rtlCol="0">
+            <a:spAutoFit/>
+          </a:bodyPr>
+          <a:lstStyle/>
+          <a:p>
+            <a:r>
+              <a:rPr lang="en-AU" dirty="0"/>
+              <a:t>Variables:</a:t>
+            </a:r>
+          </a:p>
+          <a:p>
+            <a:r>
+              <a:rPr lang="en-AU" dirty="0"/>
+              <a:t>-A move variable that controls the movement of the elevator.</a:t>
+            </a:r>
+          </a:p>
+          <a:p>
+            <a:r>
+              <a:rPr lang="en-AU" dirty="0"/>
+              <a:t>-A door variable that is either true for open or false for closed.</a:t>
+            </a:r>
+          </a:p>
+          <a:p>
+            <a:r>
+              <a:rPr lang="en-AU" dirty="0"/>
+              <a:t>-A floor variable that tells the user the floor there going too.</a:t>
+            </a:r>
+          </a:p>
+          <a:p>
+            <a:r>
+              <a:rPr lang="en-AU" dirty="0"/>
+              <a:t>-A position variable that shows the position of the elevator/where they currently are.</a:t>
+            </a:r>
+          </a:p>
+          <a:p>
+            <a:r>
+              <a:rPr lang="en-AU" dirty="0"/>
+              <a:t>-Lift is the constructor.</a:t>
+            </a:r>
+          </a:p>
+          <a:p>
+            <a:r>
+              <a:rPr lang="en-AU"/>
+              <a:t>-The </a:t>
+            </a:r>
+            <a:r>
+              <a:rPr lang="en-AU" dirty="0"/>
+              <a:t>Move() method calculates the movement and the Door() method controls the doors.</a:t>
+            </a:r>
+          </a:p>
+          <a:p>
+            <a:endParaRPr lang="en-AU" dirty="0"/>
+          </a:p>
+          <a:p>
+            <a:endParaRPr lang="en-AU" dirty="0"/>
+          </a:p>
+          <a:p>
+            <a:endParaRPr lang="en-AU" dirty="0"/>
+          </a:p>
+        </p:txBody>
+      </p:sp>
     </p:spTree>
     <p:extLst>
       <p:ext uri="{BB962C8B-B14F-4D97-AF65-F5344CB8AC3E}">

</xml_diff>

<commit_message>
added the extra features slide
</commit_message>
<xml_diff>
--- a/Presentation1.pptx
+++ b/Presentation1.pptx
@@ -5288,12 +5288,32 @@
             <p:ph idx="1"/>
           </p:nvPr>
         </p:nvSpPr>
-        <p:spPr/>
+        <p:spPr>
+          <a:xfrm>
+            <a:off x="989400" y="1685925"/>
+            <a:ext cx="5419713" cy="4040191"/>
+          </a:xfrm>
+        </p:spPr>
         <p:txBody>
           <a:bodyPr/>
           <a:lstStyle/>
           <a:p>
-            <a:endParaRPr lang="en-AU"/>
+            <a:r>
+              <a:rPr lang="en-AU" dirty="0"/>
+              <a:t>The extras feature class will add music, air conditioning and lighting. The class will also power everything off if the elevator is not running.</a:t>
+            </a:r>
+          </a:p>
+          <a:p>
+            <a:r>
+              <a:rPr lang="en-AU" dirty="0"/>
+              <a:t>The variables are lights, music, power and conditioning. All bools besides music. </a:t>
+            </a:r>
+          </a:p>
+          <a:p>
+            <a:endParaRPr lang="en-AU" dirty="0"/>
+          </a:p>
+          <a:p>
+            <a:endParaRPr lang="en-AU" dirty="0"/>
           </a:p>
         </p:txBody>
       </p:sp>

</xml_diff>

<commit_message>
Added Sequence diagram Summoning
</commit_message>
<xml_diff>
--- a/Presentation1.pptx
+++ b/Presentation1.pptx
@@ -12,6 +12,7 @@
     <p:sldId id="260" r:id="rId6"/>
     <p:sldId id="261" r:id="rId7"/>
     <p:sldId id="262" r:id="rId8"/>
+    <p:sldId id="263" r:id="rId9"/>
   </p:sldIdLst>
   <p:sldSz cx="12192000" cy="6858000"/>
   <p:notesSz cx="6858000" cy="9144000"/>
@@ -274,7 +275,7 @@
           <a:p>
             <a:fld id="{4EC743F4-8769-40B4-85DF-6CB8DE9F66AA}" type="datetimeFigureOut">
               <a:rPr lang="en-US" smtClean="0"/>
-              <a:t>8/17/2022</a:t>
+              <a:t>8/23/2022</a:t>
             </a:fld>
             <a:endParaRPr lang="en-US"/>
           </a:p>
@@ -817,7 +818,7 @@
           <a:p>
             <a:fld id="{4EC743F4-8769-40B4-85DF-6CB8DE9F66AA}" type="datetimeFigureOut">
               <a:rPr lang="en-US" smtClean="0"/>
-              <a:t>8/17/2022</a:t>
+              <a:t>8/23/2022</a:t>
             </a:fld>
             <a:endParaRPr lang="en-US"/>
           </a:p>
@@ -1025,7 +1026,7 @@
           <a:p>
             <a:fld id="{4EC743F4-8769-40B4-85DF-6CB8DE9F66AA}" type="datetimeFigureOut">
               <a:rPr lang="en-US" smtClean="0"/>
-              <a:t>8/17/2022</a:t>
+              <a:t>8/23/2022</a:t>
             </a:fld>
             <a:endParaRPr lang="en-US"/>
           </a:p>
@@ -1224,7 +1225,7 @@
           <a:p>
             <a:fld id="{4EC743F4-8769-40B4-85DF-6CB8DE9F66AA}" type="datetimeFigureOut">
               <a:rPr lang="en-US" smtClean="0"/>
-              <a:t>8/17/2022</a:t>
+              <a:t>8/23/2022</a:t>
             </a:fld>
             <a:endParaRPr lang="en-US"/>
           </a:p>
@@ -1507,7 +1508,7 @@
           <a:p>
             <a:fld id="{4EC743F4-8769-40B4-85DF-6CB8DE9F66AA}" type="datetimeFigureOut">
               <a:rPr lang="en-US" smtClean="0"/>
-              <a:t>8/17/2022</a:t>
+              <a:t>8/23/2022</a:t>
             </a:fld>
             <a:endParaRPr lang="en-US" dirty="0"/>
           </a:p>
@@ -2458,7 +2459,7 @@
           <a:p>
             <a:fld id="{4EC743F4-8769-40B4-85DF-6CB8DE9F66AA}" type="datetimeFigureOut">
               <a:rPr lang="en-US" smtClean="0"/>
-              <a:t>8/17/2022</a:t>
+              <a:t>8/23/2022</a:t>
             </a:fld>
             <a:endParaRPr lang="en-US"/>
           </a:p>
@@ -2877,7 +2878,7 @@
           <a:p>
             <a:fld id="{4EC743F4-8769-40B4-85DF-6CB8DE9F66AA}" type="datetimeFigureOut">
               <a:rPr lang="en-US" smtClean="0"/>
-              <a:t>8/17/2022</a:t>
+              <a:t>8/23/2022</a:t>
             </a:fld>
             <a:endParaRPr lang="en-US"/>
           </a:p>
@@ -3018,7 +3019,7 @@
           <a:p>
             <a:fld id="{4EC743F4-8769-40B4-85DF-6CB8DE9F66AA}" type="datetimeFigureOut">
               <a:rPr lang="en-US" smtClean="0"/>
-              <a:t>8/17/2022</a:t>
+              <a:t>8/23/2022</a:t>
             </a:fld>
             <a:endParaRPr lang="en-US"/>
           </a:p>
@@ -3131,7 +3132,7 @@
           <a:p>
             <a:fld id="{4EC743F4-8769-40B4-85DF-6CB8DE9F66AA}" type="datetimeFigureOut">
               <a:rPr lang="en-US" smtClean="0"/>
-              <a:t>8/17/2022</a:t>
+              <a:t>8/23/2022</a:t>
             </a:fld>
             <a:endParaRPr lang="en-US"/>
           </a:p>
@@ -3448,7 +3449,7 @@
           <a:p>
             <a:fld id="{4EC743F4-8769-40B4-85DF-6CB8DE9F66AA}" type="datetimeFigureOut">
               <a:rPr lang="en-US" smtClean="0"/>
-              <a:t>8/17/2022</a:t>
+              <a:t>8/23/2022</a:t>
             </a:fld>
             <a:endParaRPr lang="en-US"/>
           </a:p>
@@ -3793,7 +3794,7 @@
           <a:p>
             <a:fld id="{4EC743F4-8769-40B4-85DF-6CB8DE9F66AA}" type="datetimeFigureOut">
               <a:rPr lang="en-US" smtClean="0"/>
-              <a:t>8/17/2022</a:t>
+              <a:t>8/23/2022</a:t>
             </a:fld>
             <a:endParaRPr lang="en-US"/>
           </a:p>
@@ -4088,7 +4089,7 @@
             <a:fld id="{4EC743F4-8769-40B4-85DF-6CB8DE9F66AA}" type="datetimeFigureOut">
               <a:rPr lang="en-US" smtClean="0"/>
               <a:pPr/>
-              <a:t>8/17/2022</a:t>
+              <a:t>8/23/2022</a:t>
             </a:fld>
             <a:endParaRPr lang="en-US" dirty="0"/>
           </a:p>
@@ -5685,6 +5686,66 @@
 </p:sld>
 </file>
 
+<file path=ppt/slides/slide8.xml><?xml version="1.0" encoding="utf-8"?>
+<p:sld xmlns:a="http://schemas.openxmlformats.org/drawingml/2006/main" xmlns:r="http://schemas.openxmlformats.org/officeDocument/2006/relationships" xmlns:p="http://schemas.openxmlformats.org/presentationml/2006/main">
+  <p:cSld>
+    <p:spTree>
+      <p:nvGrpSpPr>
+        <p:cNvPr id="1" name=""/>
+        <p:cNvGrpSpPr/>
+        <p:nvPr/>
+      </p:nvGrpSpPr>
+      <p:grpSpPr>
+        <a:xfrm>
+          <a:off x="0" y="0"/>
+          <a:ext cx="0" cy="0"/>
+          <a:chOff x="0" y="0"/>
+          <a:chExt cx="0" cy="0"/>
+        </a:xfrm>
+      </p:grpSpPr>
+      <p:pic>
+        <p:nvPicPr>
+          <p:cNvPr id="5" name="Picture 4">
+            <a:extLst>
+              <a:ext uri="{FF2B5EF4-FFF2-40B4-BE49-F238E27FC236}">
+                <a16:creationId xmlns:a16="http://schemas.microsoft.com/office/drawing/2014/main" id="{9E06D666-4A3D-B2C7-8B7B-8AC450718997}"/>
+              </a:ext>
+            </a:extLst>
+          </p:cNvPr>
+          <p:cNvPicPr>
+            <a:picLocks noChangeAspect="1"/>
+          </p:cNvPicPr>
+          <p:nvPr/>
+        </p:nvPicPr>
+        <p:blipFill>
+          <a:blip r:embed="rId2"/>
+          <a:stretch>
+            <a:fillRect/>
+          </a:stretch>
+        </p:blipFill>
+        <p:spPr>
+          <a:xfrm>
+            <a:off x="1" y="0"/>
+            <a:ext cx="6096000" cy="3621789"/>
+          </a:xfrm>
+          <a:prstGeom prst="rect">
+            <a:avLst/>
+          </a:prstGeom>
+        </p:spPr>
+      </p:pic>
+    </p:spTree>
+    <p:extLst>
+      <p:ext uri="{BB962C8B-B14F-4D97-AF65-F5344CB8AC3E}">
+        <p14:creationId xmlns:p14="http://schemas.microsoft.com/office/powerpoint/2010/main" val="1313968250"/>
+      </p:ext>
+    </p:extLst>
+  </p:cSld>
+  <p:clrMapOvr>
+    <a:masterClrMapping/>
+  </p:clrMapOvr>
+</p:sld>
+</file>
+
 <file path=ppt/theme/theme1.xml><?xml version="1.0" encoding="utf-8"?>
 <a:theme xmlns:a="http://schemas.openxmlformats.org/drawingml/2006/main" name="FrostyVTI">
   <a:themeElements>

</xml_diff>

<commit_message>
added in the fire alarm diagram
</commit_message>
<xml_diff>
--- a/Presentation1.pptx
+++ b/Presentation1.pptx
@@ -5733,6 +5733,36 @@
           </a:prstGeom>
         </p:spPr>
       </p:pic>
+      <p:pic>
+        <p:nvPicPr>
+          <p:cNvPr id="3" name="Picture 2">
+            <a:extLst>
+              <a:ext uri="{FF2B5EF4-FFF2-40B4-BE49-F238E27FC236}">
+                <a16:creationId xmlns:a16="http://schemas.microsoft.com/office/drawing/2014/main" id="{9CD2306D-DF8E-E4F9-8E12-3CD6FA0C5DEB}"/>
+              </a:ext>
+            </a:extLst>
+          </p:cNvPr>
+          <p:cNvPicPr>
+            <a:picLocks noChangeAspect="1"/>
+          </p:cNvPicPr>
+          <p:nvPr/>
+        </p:nvPicPr>
+        <p:blipFill>
+          <a:blip r:embed="rId3"/>
+          <a:stretch>
+            <a:fillRect/>
+          </a:stretch>
+        </p:blipFill>
+        <p:spPr>
+          <a:xfrm>
+            <a:off x="6095999" y="0"/>
+            <a:ext cx="6095999" cy="4233911"/>
+          </a:xfrm>
+          <a:prstGeom prst="rect">
+            <a:avLst/>
+          </a:prstGeom>
+        </p:spPr>
+      </p:pic>
     </p:spTree>
     <p:extLst>
       <p:ext uri="{BB962C8B-B14F-4D97-AF65-F5344CB8AC3E}">

</xml_diff>

<commit_message>
added my seq diagram
</commit_message>
<xml_diff>
--- a/Presentation1.pptx
+++ b/Presentation1.pptx
@@ -5747,16 +5747,50 @@
           </p:cNvPicPr>
           <p:nvPr/>
         </p:nvPicPr>
-        <p:blipFill>
+        <p:blipFill rotWithShape="1">
           <a:blip r:embed="rId3"/>
-          <a:stretch>
-            <a:fillRect/>
-          </a:stretch>
+          <a:srcRect r="1102" b="5867"/>
+          <a:stretch/>
         </p:blipFill>
         <p:spPr>
           <a:xfrm>
-            <a:off x="6095999" y="0"/>
-            <a:ext cx="6095999" cy="4233911"/>
+            <a:off x="6096000" y="0"/>
+            <a:ext cx="6095999" cy="3525625"/>
+          </a:xfrm>
+          <a:prstGeom prst="rect">
+            <a:avLst/>
+          </a:prstGeom>
+        </p:spPr>
+      </p:pic>
+      <p:pic>
+        <p:nvPicPr>
+          <p:cNvPr id="4" name="Picture 3" descr="A picture containing diagram&#10;&#10;Description automatically generated">
+            <a:extLst>
+              <a:ext uri="{FF2B5EF4-FFF2-40B4-BE49-F238E27FC236}">
+                <a16:creationId xmlns:a16="http://schemas.microsoft.com/office/drawing/2014/main" id="{F858E134-D660-5AA5-26B5-15343998EDDF}"/>
+              </a:ext>
+            </a:extLst>
+          </p:cNvPr>
+          <p:cNvPicPr>
+            <a:picLocks noChangeAspect="1"/>
+          </p:cNvPicPr>
+          <p:nvPr/>
+        </p:nvPicPr>
+        <p:blipFill rotWithShape="1">
+          <a:blip r:embed="rId4">
+            <a:extLst>
+              <a:ext uri="{28A0092B-C50C-407E-A947-70E740481C1C}">
+                <a14:useLocalDpi xmlns:a14="http://schemas.microsoft.com/office/drawing/2010/main" val="0"/>
+              </a:ext>
+            </a:extLst>
+          </a:blip>
+          <a:srcRect l="40017" t="589" r="5637" b="8097"/>
+          <a:stretch/>
+        </p:blipFill>
+        <p:spPr>
+          <a:xfrm>
+            <a:off x="0" y="3525625"/>
+            <a:ext cx="6095998" cy="3332375"/>
           </a:xfrm>
           <a:prstGeom prst="rect">
             <a:avLst/>

</xml_diff>